<commit_message>
Atualizei a parte da contextualização
</commit_message>
<xml_diff>
--- a/Documentação/slide-synergy.pptx
+++ b/Documentação/slide-synergy.pptx
@@ -131,7 +131,7 @@
 <file path=ppt/revisionInfo.xml><?xml version="1.0" encoding="utf-8"?>
 <p1510:revInfo xmlns:a="http://schemas.openxmlformats.org/drawingml/2006/main" xmlns:r="http://schemas.openxmlformats.org/officeDocument/2006/relationships" xmlns:p1510="http://schemas.microsoft.com/office/powerpoint/2015/10/main">
   <p1510:revLst>
-    <p1510:client id="{60410696-5CC5-4378-B7D5-F21A4F4E8897}" v="107" dt="2020-04-23T16:14:11.214"/>
+    <p1510:client id="{60410696-5CC5-4378-B7D5-F21A4F4E8897}" v="345" dt="2020-04-24T15:56:29.870"/>
   </p1510:revLst>
 </p1510:revInfo>
 </file>
@@ -140,23 +140,53 @@
 <pc:chgInfo xmlns:a="http://schemas.openxmlformats.org/drawingml/2006/main" xmlns:r="http://schemas.openxmlformats.org/officeDocument/2006/relationships" xmlns:ac="http://schemas.microsoft.com/office/drawing/2013/main/command" xmlns:pc="http://schemas.microsoft.com/office/powerpoint/2013/main/command">
   <pc:docChgLst>
     <pc:chgData name="julia marle" userId="450d1bbef5244860" providerId="LiveId" clId="{60410696-5CC5-4378-B7D5-F21A4F4E8897}"/>
-    <pc:docChg chg="modSld">
-      <pc:chgData name="julia marle" userId="450d1bbef5244860" providerId="LiveId" clId="{60410696-5CC5-4378-B7D5-F21A4F4E8897}" dt="2020-04-23T16:14:11.213" v="106" actId="20577"/>
+    <pc:docChg chg="undo custSel modSld">
+      <pc:chgData name="julia marle" userId="450d1bbef5244860" providerId="LiveId" clId="{60410696-5CC5-4378-B7D5-F21A4F4E8897}" dt="2020-04-24T15:56:29.870" v="346" actId="20577"/>
       <pc:docMkLst>
         <pc:docMk/>
       </pc:docMkLst>
-      <pc:sldChg chg="modSp modAnim">
-        <pc:chgData name="julia marle" userId="450d1bbef5244860" providerId="LiveId" clId="{60410696-5CC5-4378-B7D5-F21A4F4E8897}" dt="2020-04-23T16:14:11.213" v="106" actId="20577"/>
+      <pc:sldChg chg="modSp addAnim delAnim modAnim">
+        <pc:chgData name="julia marle" userId="450d1bbef5244860" providerId="LiveId" clId="{60410696-5CC5-4378-B7D5-F21A4F4E8897}" dt="2020-04-24T15:56:29.870" v="346" actId="20577"/>
         <pc:sldMkLst>
           <pc:docMk/>
           <pc:sldMk cId="1268792719" sldId="258"/>
         </pc:sldMkLst>
         <pc:spChg chg="mod">
-          <ac:chgData name="julia marle" userId="450d1bbef5244860" providerId="LiveId" clId="{60410696-5CC5-4378-B7D5-F21A4F4E8897}" dt="2020-04-23T16:14:11.213" v="106" actId="20577"/>
+          <ac:chgData name="julia marle" userId="450d1bbef5244860" providerId="LiveId" clId="{60410696-5CC5-4378-B7D5-F21A4F4E8897}" dt="2020-04-24T15:56:29.870" v="346" actId="20577"/>
           <ac:spMkLst>
             <pc:docMk/>
             <pc:sldMk cId="1268792719" sldId="258"/>
             <ac:spMk id="6" creationId="{FE989C62-5914-45D9-B2FF-7FB8E76D6324}"/>
+          </ac:spMkLst>
+        </pc:spChg>
+      </pc:sldChg>
+      <pc:sldChg chg="modSp modAnim">
+        <pc:chgData name="julia marle" userId="450d1bbef5244860" providerId="LiveId" clId="{60410696-5CC5-4378-B7D5-F21A4F4E8897}" dt="2020-04-24T14:29:04.095" v="267"/>
+        <pc:sldMkLst>
+          <pc:docMk/>
+          <pc:sldMk cId="1488327079" sldId="259"/>
+        </pc:sldMkLst>
+        <pc:spChg chg="mod">
+          <ac:chgData name="julia marle" userId="450d1bbef5244860" providerId="LiveId" clId="{60410696-5CC5-4378-B7D5-F21A4F4E8897}" dt="2020-04-24T14:29:04.095" v="267"/>
+          <ac:spMkLst>
+            <pc:docMk/>
+            <pc:sldMk cId="1488327079" sldId="259"/>
+            <ac:spMk id="4" creationId="{FE989C62-5914-45D9-B2FF-7FB8E76D6324}"/>
+          </ac:spMkLst>
+        </pc:spChg>
+      </pc:sldChg>
+      <pc:sldChg chg="modSp modAnim">
+        <pc:chgData name="julia marle" userId="450d1bbef5244860" providerId="LiveId" clId="{60410696-5CC5-4378-B7D5-F21A4F4E8897}" dt="2020-04-24T14:30:31.797" v="321" actId="20577"/>
+        <pc:sldMkLst>
+          <pc:docMk/>
+          <pc:sldMk cId="1269980606" sldId="260"/>
+        </pc:sldMkLst>
+        <pc:spChg chg="mod">
+          <ac:chgData name="julia marle" userId="450d1bbef5244860" providerId="LiveId" clId="{60410696-5CC5-4378-B7D5-F21A4F4E8897}" dt="2020-04-24T14:30:31.797" v="321" actId="20577"/>
+          <ac:spMkLst>
+            <pc:docMk/>
+            <pc:sldMk cId="1269980606" sldId="260"/>
+            <ac:spMk id="6" creationId="{E3ACB187-7D89-4633-A76D-27ED6A650CB3}"/>
           </ac:spMkLst>
         </pc:spChg>
       </pc:sldChg>
@@ -247,7 +277,7 @@
           <a:p>
             <a:fld id="{655F7DB7-5B35-44EF-86DD-30F04B6260EF}" type="datetimeFigureOut">
               <a:rPr lang="pt-BR" smtClean="0"/>
-              <a:t>23/04/2020</a:t>
+              <a:t>24/04/2020</a:t>
             </a:fld>
             <a:endParaRPr lang="pt-BR"/>
           </a:p>
@@ -661,7 +691,7 @@
           <a:p>
             <a:fld id="{15B003F1-72A3-4565-B369-F67C067E940D}" type="datetimeFigureOut">
               <a:rPr lang="pt-BR" smtClean="0"/>
-              <a:t>23/04/2020</a:t>
+              <a:t>24/04/2020</a:t>
             </a:fld>
             <a:endParaRPr lang="pt-BR"/>
           </a:p>
@@ -862,7 +892,7 @@
           <a:p>
             <a:fld id="{15B003F1-72A3-4565-B369-F67C067E940D}" type="datetimeFigureOut">
               <a:rPr lang="pt-BR" smtClean="0"/>
-              <a:t>23/04/2020</a:t>
+              <a:t>24/04/2020</a:t>
             </a:fld>
             <a:endParaRPr lang="pt-BR"/>
           </a:p>
@@ -1073,7 +1103,7 @@
           <a:p>
             <a:fld id="{15B003F1-72A3-4565-B369-F67C067E940D}" type="datetimeFigureOut">
               <a:rPr lang="pt-BR" smtClean="0"/>
-              <a:t>23/04/2020</a:t>
+              <a:t>24/04/2020</a:t>
             </a:fld>
             <a:endParaRPr lang="pt-BR"/>
           </a:p>
@@ -1274,7 +1304,7 @@
           <a:p>
             <a:fld id="{15B003F1-72A3-4565-B369-F67C067E940D}" type="datetimeFigureOut">
               <a:rPr lang="pt-BR" smtClean="0"/>
-              <a:t>23/04/2020</a:t>
+              <a:t>24/04/2020</a:t>
             </a:fld>
             <a:endParaRPr lang="pt-BR"/>
           </a:p>
@@ -1552,7 +1582,7 @@
           <a:p>
             <a:fld id="{15B003F1-72A3-4565-B369-F67C067E940D}" type="datetimeFigureOut">
               <a:rPr lang="pt-BR" smtClean="0"/>
-              <a:t>23/04/2020</a:t>
+              <a:t>24/04/2020</a:t>
             </a:fld>
             <a:endParaRPr lang="pt-BR"/>
           </a:p>
@@ -1820,7 +1850,7 @@
           <a:p>
             <a:fld id="{15B003F1-72A3-4565-B369-F67C067E940D}" type="datetimeFigureOut">
               <a:rPr lang="pt-BR" smtClean="0"/>
-              <a:t>23/04/2020</a:t>
+              <a:t>24/04/2020</a:t>
             </a:fld>
             <a:endParaRPr lang="pt-BR"/>
           </a:p>
@@ -2235,7 +2265,7 @@
           <a:p>
             <a:fld id="{15B003F1-72A3-4565-B369-F67C067E940D}" type="datetimeFigureOut">
               <a:rPr lang="pt-BR" smtClean="0"/>
-              <a:t>23/04/2020</a:t>
+              <a:t>24/04/2020</a:t>
             </a:fld>
             <a:endParaRPr lang="pt-BR"/>
           </a:p>
@@ -2379,7 +2409,7 @@
           <a:p>
             <a:fld id="{15B003F1-72A3-4565-B369-F67C067E940D}" type="datetimeFigureOut">
               <a:rPr lang="pt-BR" smtClean="0"/>
-              <a:t>23/04/2020</a:t>
+              <a:t>24/04/2020</a:t>
             </a:fld>
             <a:endParaRPr lang="pt-BR"/>
           </a:p>
@@ -2495,7 +2525,7 @@
           <a:p>
             <a:fld id="{15B003F1-72A3-4565-B369-F67C067E940D}" type="datetimeFigureOut">
               <a:rPr lang="pt-BR" smtClean="0"/>
-              <a:t>23/04/2020</a:t>
+              <a:t>24/04/2020</a:t>
             </a:fld>
             <a:endParaRPr lang="pt-BR"/>
           </a:p>
@@ -2809,7 +2839,7 @@
           <a:p>
             <a:fld id="{15B003F1-72A3-4565-B369-F67C067E940D}" type="datetimeFigureOut">
               <a:rPr lang="pt-BR" smtClean="0"/>
-              <a:t>23/04/2020</a:t>
+              <a:t>24/04/2020</a:t>
             </a:fld>
             <a:endParaRPr lang="pt-BR"/>
           </a:p>
@@ -3100,7 +3130,7 @@
           <a:p>
             <a:fld id="{15B003F1-72A3-4565-B369-F67C067E940D}" type="datetimeFigureOut">
               <a:rPr lang="pt-BR" smtClean="0"/>
-              <a:t>23/04/2020</a:t>
+              <a:t>24/04/2020</a:t>
             </a:fld>
             <a:endParaRPr lang="pt-BR"/>
           </a:p>
@@ -3344,7 +3374,7 @@
           <a:p>
             <a:fld id="{15B003F1-72A3-4565-B369-F67C067E940D}" type="datetimeFigureOut">
               <a:rPr lang="pt-BR" smtClean="0"/>
-              <a:t>23/04/2020</a:t>
+              <a:t>24/04/2020</a:t>
             </a:fld>
             <a:endParaRPr lang="pt-BR"/>
           </a:p>
@@ -6177,7 +6207,7 @@
         <p:spPr>
           <a:xfrm>
             <a:off x="838200" y="2274838"/>
-            <a:ext cx="5995851" cy="2000548"/>
+            <a:ext cx="5995851" cy="1938992"/>
           </a:xfrm>
           <a:prstGeom prst="rect">
             <a:avLst/>
@@ -6200,32 +6230,6 @@
             </a:pPr>
             <a:r>
               <a:rPr lang="pt-BR" sz="2400" dirty="0">
-                <a:latin typeface="Bariol Bold" panose="02000506040000020003" pitchFamily="2" charset="0"/>
-              </a:rPr>
-              <a:t>Superlotação é a maior reclamação dos usuários do Metrô e da CPTM.</a:t>
-            </a:r>
-          </a:p>
-          <a:p>
-            <a:pPr>
-              <a:buClr>
-                <a:srgbClr val="4772FF"/>
-              </a:buClr>
-              <a:buSzPct val="80000"/>
-            </a:pPr>
-            <a:r>
-              <a:rPr lang="pt-BR" sz="2400" dirty="0">
-                <a:latin typeface="Bariol Bold" panose="02000506040000020003" pitchFamily="2" charset="0"/>
-              </a:rPr>
-              <a:t>                                                     </a:t>
-            </a:r>
-            <a:r>
-              <a:rPr lang="pt-BR" sz="2800" dirty="0">
-                <a:latin typeface="Bariol Bold" panose="02000506040000020003" pitchFamily="2" charset="0"/>
-              </a:rPr>
-              <a:t> </a:t>
-            </a:r>
-            <a:r>
-              <a:rPr lang="pt-BR" sz="2400">
                 <a:solidFill>
                   <a:schemeClr val="tx1">
                     <a:lumMod val="85000"/>
@@ -6234,7 +6238,27 @@
                 </a:solidFill>
                 <a:latin typeface="Bariol Bold" panose="02000506040000020003" pitchFamily="2" charset="0"/>
               </a:rPr>
-              <a:t>- Procon</a:t>
+              <a:t>O metro já chegou a transportar 7,8 milhões de pessoas em um dia.</a:t>
+            </a:r>
+          </a:p>
+          <a:p>
+            <a:pPr>
+              <a:buClr>
+                <a:srgbClr val="4772FF"/>
+              </a:buClr>
+              <a:buSzPct val="80000"/>
+            </a:pPr>
+            <a:r>
+              <a:rPr lang="pt-BR" sz="2400" dirty="0">
+                <a:solidFill>
+                  <a:schemeClr val="tx1">
+                    <a:lumMod val="85000"/>
+                    <a:lumOff val="15000"/>
+                  </a:schemeClr>
+                </a:solidFill>
+                <a:latin typeface="Bariol Bold" panose="02000506040000020003" pitchFamily="2" charset="0"/>
+              </a:rPr>
+              <a:t>                                                      - </a:t>
             </a:r>
             <a:endParaRPr lang="pt-BR" sz="2400" dirty="0">
               <a:latin typeface="Bariol Bold" panose="02000506040000020003" pitchFamily="2" charset="0"/>
@@ -6253,8 +6277,17 @@
               <a:rPr lang="pt-BR" sz="2400" dirty="0">
                 <a:latin typeface="Bariol Bold" panose="02000506040000020003" pitchFamily="2" charset="0"/>
               </a:rPr>
-              <a:t>	</a:t>
-            </a:r>
+              <a:t>Intervalo de </a:t>
+            </a:r>
+            <a:r>
+              <a:rPr lang="pt-BR" sz="2400">
+                <a:latin typeface="Bariol Bold" panose="02000506040000020003" pitchFamily="2" charset="0"/>
+              </a:rPr>
+              <a:t>99 segundos </a:t>
+            </a:r>
+            <a:endParaRPr lang="pt-BR" sz="2400" dirty="0">
+              <a:latin typeface="Bariol Bold" panose="02000506040000020003" pitchFamily="2" charset="0"/>
+            </a:endParaRPr>
           </a:p>
           <a:p>
             <a:pPr>
@@ -6360,15 +6393,24 @@
                                   </p:childTnLst>
                                 </p:cTn>
                               </p:par>
+                            </p:childTnLst>
+                          </p:cTn>
+                        </p:par>
+                        <p:par>
+                          <p:cTn id="8" fill="hold">
+                            <p:stCondLst>
+                              <p:cond delay="500"/>
+                            </p:stCondLst>
+                            <p:childTnLst>
                               <p:par>
-                                <p:cTn id="8" presetID="10" presetClass="entr" presetSubtype="0" fill="hold" grpId="0" nodeType="withEffect">
+                                <p:cTn id="9" presetID="10" presetClass="entr" presetSubtype="0" fill="hold" grpId="0" nodeType="afterEffect">
                                   <p:stCondLst>
                                     <p:cond delay="0"/>
                                   </p:stCondLst>
                                   <p:childTnLst>
                                     <p:set>
                                       <p:cBhvr>
-                                        <p:cTn id="9" dur="1" fill="hold">
+                                        <p:cTn id="10" dur="1" fill="hold">
                                           <p:stCondLst>
                                             <p:cond delay="0"/>
                                           </p:stCondLst>
@@ -6390,7 +6432,7 @@
                                     </p:set>
                                     <p:animEffect transition="in" filter="fade">
                                       <p:cBhvr>
-                                        <p:cTn id="10" dur="500"/>
+                                        <p:cTn id="11" dur="500"/>
                                         <p:tgtEl>
                                           <p:spTgt spid="6">
                                             <p:txEl>
@@ -6403,17 +6445,8 @@
                                   </p:childTnLst>
                                 </p:cTn>
                               </p:par>
-                            </p:childTnLst>
-                          </p:cTn>
-                        </p:par>
-                        <p:par>
-                          <p:cTn id="11" fill="hold">
-                            <p:stCondLst>
-                              <p:cond delay="500"/>
-                            </p:stCondLst>
-                            <p:childTnLst>
                               <p:par>
-                                <p:cTn id="12" presetID="10" presetClass="entr" presetSubtype="0" fill="hold" grpId="0" nodeType="afterEffect">
+                                <p:cTn id="12" presetID="10" presetClass="entr" presetSubtype="0" fill="hold" grpId="0" nodeType="withEffect">
                                   <p:stCondLst>
                                     <p:cond delay="0"/>
                                   </p:stCondLst>
@@ -6716,7 +6749,7 @@
         <p:spPr>
           <a:xfrm>
             <a:off x="838200" y="2274838"/>
-            <a:ext cx="5995851" cy="1938992"/>
+            <a:ext cx="5995851" cy="2369880"/>
           </a:xfrm>
           <a:prstGeom prst="rect">
             <a:avLst/>
@@ -6768,8 +6801,43 @@
               <a:rPr lang="pt-BR" sz="2400" dirty="0">
                 <a:latin typeface="Bariol Bold" panose="02000506040000020003" pitchFamily="2" charset="0"/>
               </a:rPr>
-              <a:t>Empresas com necessidade de posicionar seus negócios estrategicamente</a:t>
-            </a:r>
+              <a:t>Superlotação é a maior reclamação dos usuários do Metrô e da CPTM.</a:t>
+            </a:r>
+          </a:p>
+          <a:p>
+            <a:pPr>
+              <a:buClr>
+                <a:srgbClr val="4772FF"/>
+              </a:buClr>
+              <a:buSzPct val="80000"/>
+            </a:pPr>
+            <a:r>
+              <a:rPr lang="pt-BR" sz="2400" dirty="0">
+                <a:latin typeface="Bariol Bold" panose="02000506040000020003" pitchFamily="2" charset="0"/>
+              </a:rPr>
+              <a:t>                                                     </a:t>
+            </a:r>
+            <a:r>
+              <a:rPr lang="pt-BR" sz="2800" dirty="0">
+                <a:latin typeface="Bariol Bold" panose="02000506040000020003" pitchFamily="2" charset="0"/>
+              </a:rPr>
+              <a:t> </a:t>
+            </a:r>
+            <a:r>
+              <a:rPr lang="pt-BR" sz="2400" dirty="0">
+                <a:solidFill>
+                  <a:schemeClr val="tx1">
+                    <a:lumMod val="85000"/>
+                    <a:lumOff val="15000"/>
+                  </a:schemeClr>
+                </a:solidFill>
+                <a:latin typeface="Bariol Bold" panose="02000506040000020003" pitchFamily="2" charset="0"/>
+              </a:rPr>
+              <a:t>- Procon</a:t>
+            </a:r>
+            <a:endParaRPr lang="pt-BR" sz="2400" dirty="0">
+              <a:latin typeface="Bariol Bold" panose="02000506040000020003" pitchFamily="2" charset="0"/>
+            </a:endParaRPr>
           </a:p>
         </p:txBody>
       </p:sp>
@@ -6852,67 +6920,15 @@
                                   </p:childTnLst>
                                 </p:cTn>
                               </p:par>
-                            </p:childTnLst>
-                          </p:cTn>
-                        </p:par>
-                        <p:par>
-                          <p:cTn id="8" fill="hold">
-                            <p:stCondLst>
-                              <p:cond delay="500"/>
-                            </p:stCondLst>
-                            <p:childTnLst>
                               <p:par>
-                                <p:cTn id="9" presetID="10" presetClass="entr" presetSubtype="0" fill="hold" grpId="0" nodeType="afterEffect">
+                                <p:cTn id="8" presetID="10" presetClass="entr" presetSubtype="0" fill="hold" nodeType="withEffect">
                                   <p:stCondLst>
                                     <p:cond delay="0"/>
                                   </p:stCondLst>
                                   <p:childTnLst>
                                     <p:set>
                                       <p:cBhvr>
-                                        <p:cTn id="10" dur="1" fill="hold">
-                                          <p:stCondLst>
-                                            <p:cond delay="0"/>
-                                          </p:stCondLst>
-                                        </p:cTn>
-                                        <p:tgtEl>
-                                          <p:spTgt spid="4">
-                                            <p:txEl>
-                                              <p:pRg st="2" end="2"/>
-                                            </p:txEl>
-                                          </p:spTgt>
-                                        </p:tgtEl>
-                                        <p:attrNameLst>
-                                          <p:attrName>style.visibility</p:attrName>
-                                        </p:attrNameLst>
-                                      </p:cBhvr>
-                                      <p:to>
-                                        <p:strVal val="visible"/>
-                                      </p:to>
-                                    </p:set>
-                                    <p:animEffect transition="in" filter="fade">
-                                      <p:cBhvr>
-                                        <p:cTn id="11" dur="500"/>
-                                        <p:tgtEl>
-                                          <p:spTgt spid="4">
-                                            <p:txEl>
-                                              <p:pRg st="2" end="2"/>
-                                            </p:txEl>
-                                          </p:spTgt>
-                                        </p:tgtEl>
-                                      </p:cBhvr>
-                                    </p:animEffect>
-                                  </p:childTnLst>
-                                </p:cTn>
-                              </p:par>
-                              <p:par>
-                                <p:cTn id="12" presetID="10" presetClass="entr" presetSubtype="0" fill="hold" nodeType="withEffect">
-                                  <p:stCondLst>
-                                    <p:cond delay="0"/>
-                                  </p:stCondLst>
-                                  <p:childTnLst>
-                                    <p:set>
-                                      <p:cBhvr>
-                                        <p:cTn id="13" dur="1" fill="hold">
+                                        <p:cTn id="9" dur="1" fill="hold">
                                           <p:stCondLst>
                                             <p:cond delay="0"/>
                                           </p:stCondLst>
@@ -6930,7 +6946,7 @@
                                     </p:set>
                                     <p:animEffect transition="in" filter="fade">
                                       <p:cBhvr>
-                                        <p:cTn id="14" dur="500"/>
+                                        <p:cTn id="10" dur="500"/>
                                         <p:tgtEl>
                                           <p:spTgt spid="6"/>
                                         </p:tgtEl>
@@ -7113,7 +7129,7 @@
         <p:spPr>
           <a:xfrm>
             <a:off x="838200" y="2274838"/>
-            <a:ext cx="5995851" cy="1938992"/>
+            <a:ext cx="5995851" cy="3046988"/>
           </a:xfrm>
           <a:prstGeom prst="rect">
             <a:avLst/>
@@ -7195,6 +7211,35 @@
                 <a:latin typeface="Bariol Bold" panose="02000506040000020003" pitchFamily="2" charset="0"/>
               </a:rPr>
               <a:t>Possibilidade de ver rotas alternativas</a:t>
+            </a:r>
+          </a:p>
+          <a:p>
+            <a:pPr marL="342900" indent="-342900">
+              <a:buClr>
+                <a:srgbClr val="4772FF"/>
+              </a:buClr>
+              <a:buSzPct val="80000"/>
+              <a:buFont typeface="Wingdings" panose="05000000000000000000" pitchFamily="2" charset="2"/>
+              <a:buChar char="Ø"/>
+            </a:pPr>
+            <a:endParaRPr lang="pt-BR" sz="2400" dirty="0">
+              <a:latin typeface="Bariol Bold" panose="02000506040000020003" pitchFamily="2" charset="0"/>
+            </a:endParaRPr>
+          </a:p>
+          <a:p>
+            <a:pPr marL="342900" indent="-342900">
+              <a:buClr>
+                <a:srgbClr val="4772FF"/>
+              </a:buClr>
+              <a:buSzPct val="80000"/>
+              <a:buFont typeface="Wingdings" panose="05000000000000000000" pitchFamily="2" charset="2"/>
+              <a:buChar char="Ø"/>
+            </a:pPr>
+            <a:r>
+              <a:rPr lang="pt-BR" sz="2400" dirty="0">
+                <a:latin typeface="Bariol Bold" panose="02000506040000020003" pitchFamily="2" charset="0"/>
+              </a:rPr>
+              <a:t>Aproveitar espaços para comércios e propagandas</a:t>
             </a:r>
           </a:p>
         </p:txBody>
@@ -7385,21 +7430,82 @@
                             </p:childTnLst>
                           </p:cTn>
                         </p:par>
+                      </p:childTnLst>
+                    </p:cTn>
+                  </p:par>
+                  <p:par>
+                    <p:cTn id="16" fill="hold">
+                      <p:stCondLst>
+                        <p:cond delay="indefinite"/>
+                      </p:stCondLst>
+                      <p:childTnLst>
                         <p:par>
-                          <p:cTn id="16" fill="hold">
+                          <p:cTn id="17" fill="hold">
                             <p:stCondLst>
-                              <p:cond delay="1500"/>
+                              <p:cond delay="0"/>
                             </p:stCondLst>
                             <p:childTnLst>
                               <p:par>
-                                <p:cTn id="17" presetID="10" presetClass="entr" presetSubtype="0" fill="hold" nodeType="afterEffect">
+                                <p:cTn id="18" presetID="10" presetClass="entr" presetSubtype="0" fill="hold" grpId="0" nodeType="clickEffect">
                                   <p:stCondLst>
                                     <p:cond delay="0"/>
                                   </p:stCondLst>
                                   <p:childTnLst>
                                     <p:set>
                                       <p:cBhvr>
-                                        <p:cTn id="18" dur="1" fill="hold">
+                                        <p:cTn id="19" dur="1" fill="hold">
+                                          <p:stCondLst>
+                                            <p:cond delay="0"/>
+                                          </p:stCondLst>
+                                        </p:cTn>
+                                        <p:tgtEl>
+                                          <p:spTgt spid="6">
+                                            <p:txEl>
+                                              <p:pRg st="6" end="6"/>
+                                            </p:txEl>
+                                          </p:spTgt>
+                                        </p:tgtEl>
+                                        <p:attrNameLst>
+                                          <p:attrName>style.visibility</p:attrName>
+                                        </p:attrNameLst>
+                                      </p:cBhvr>
+                                      <p:to>
+                                        <p:strVal val="visible"/>
+                                      </p:to>
+                                    </p:set>
+                                    <p:animEffect transition="in" filter="fade">
+                                      <p:cBhvr>
+                                        <p:cTn id="20" dur="500"/>
+                                        <p:tgtEl>
+                                          <p:spTgt spid="6">
+                                            <p:txEl>
+                                              <p:pRg st="6" end="6"/>
+                                            </p:txEl>
+                                          </p:spTgt>
+                                        </p:tgtEl>
+                                      </p:cBhvr>
+                                    </p:animEffect>
+                                  </p:childTnLst>
+                                </p:cTn>
+                              </p:par>
+                            </p:childTnLst>
+                          </p:cTn>
+                        </p:par>
+                        <p:par>
+                          <p:cTn id="21" fill="hold">
+                            <p:stCondLst>
+                              <p:cond delay="500"/>
+                            </p:stCondLst>
+                            <p:childTnLst>
+                              <p:par>
+                                <p:cTn id="22" presetID="10" presetClass="entr" presetSubtype="0" fill="hold" nodeType="afterEffect">
+                                  <p:stCondLst>
+                                    <p:cond delay="0"/>
+                                  </p:stCondLst>
+                                  <p:childTnLst>
+                                    <p:set>
+                                      <p:cBhvr>
+                                        <p:cTn id="23" dur="1" fill="hold">
                                           <p:stCondLst>
                                             <p:cond delay="0"/>
                                           </p:stCondLst>
@@ -7417,7 +7523,7 @@
                                     </p:set>
                                     <p:animEffect transition="in" filter="fade">
                                       <p:cBhvr>
-                                        <p:cTn id="19" dur="500"/>
+                                        <p:cTn id="24" dur="500"/>
                                         <p:tgtEl>
                                           <p:spTgt spid="5"/>
                                         </p:tgtEl>

</xml_diff>

<commit_message>
slide alterado na apresentacao HLD e LLD
</commit_message>
<xml_diff>
--- a/Documentação/slide-synergy.pptx
+++ b/Documentação/slide-synergy.pptx
@@ -277,7 +277,7 @@
           <a:p>
             <a:fld id="{655F7DB7-5B35-44EF-86DD-30F04B6260EF}" type="datetimeFigureOut">
               <a:rPr lang="pt-BR" smtClean="0"/>
-              <a:t>24/04/2020</a:t>
+              <a:t>27/04/2020</a:t>
             </a:fld>
             <a:endParaRPr lang="pt-BR"/>
           </a:p>
@@ -691,7 +691,7 @@
           <a:p>
             <a:fld id="{15B003F1-72A3-4565-B369-F67C067E940D}" type="datetimeFigureOut">
               <a:rPr lang="pt-BR" smtClean="0"/>
-              <a:t>24/04/2020</a:t>
+              <a:t>27/04/2020</a:t>
             </a:fld>
             <a:endParaRPr lang="pt-BR"/>
           </a:p>
@@ -892,7 +892,7 @@
           <a:p>
             <a:fld id="{15B003F1-72A3-4565-B369-F67C067E940D}" type="datetimeFigureOut">
               <a:rPr lang="pt-BR" smtClean="0"/>
-              <a:t>24/04/2020</a:t>
+              <a:t>27/04/2020</a:t>
             </a:fld>
             <a:endParaRPr lang="pt-BR"/>
           </a:p>
@@ -1103,7 +1103,7 @@
           <a:p>
             <a:fld id="{15B003F1-72A3-4565-B369-F67C067E940D}" type="datetimeFigureOut">
               <a:rPr lang="pt-BR" smtClean="0"/>
-              <a:t>24/04/2020</a:t>
+              <a:t>27/04/2020</a:t>
             </a:fld>
             <a:endParaRPr lang="pt-BR"/>
           </a:p>
@@ -1304,7 +1304,7 @@
           <a:p>
             <a:fld id="{15B003F1-72A3-4565-B369-F67C067E940D}" type="datetimeFigureOut">
               <a:rPr lang="pt-BR" smtClean="0"/>
-              <a:t>24/04/2020</a:t>
+              <a:t>27/04/2020</a:t>
             </a:fld>
             <a:endParaRPr lang="pt-BR"/>
           </a:p>
@@ -1582,7 +1582,7 @@
           <a:p>
             <a:fld id="{15B003F1-72A3-4565-B369-F67C067E940D}" type="datetimeFigureOut">
               <a:rPr lang="pt-BR" smtClean="0"/>
-              <a:t>24/04/2020</a:t>
+              <a:t>27/04/2020</a:t>
             </a:fld>
             <a:endParaRPr lang="pt-BR"/>
           </a:p>
@@ -1850,7 +1850,7 @@
           <a:p>
             <a:fld id="{15B003F1-72A3-4565-B369-F67C067E940D}" type="datetimeFigureOut">
               <a:rPr lang="pt-BR" smtClean="0"/>
-              <a:t>24/04/2020</a:t>
+              <a:t>27/04/2020</a:t>
             </a:fld>
             <a:endParaRPr lang="pt-BR"/>
           </a:p>
@@ -2265,7 +2265,7 @@
           <a:p>
             <a:fld id="{15B003F1-72A3-4565-B369-F67C067E940D}" type="datetimeFigureOut">
               <a:rPr lang="pt-BR" smtClean="0"/>
-              <a:t>24/04/2020</a:t>
+              <a:t>27/04/2020</a:t>
             </a:fld>
             <a:endParaRPr lang="pt-BR"/>
           </a:p>
@@ -2409,7 +2409,7 @@
           <a:p>
             <a:fld id="{15B003F1-72A3-4565-B369-F67C067E940D}" type="datetimeFigureOut">
               <a:rPr lang="pt-BR" smtClean="0"/>
-              <a:t>24/04/2020</a:t>
+              <a:t>27/04/2020</a:t>
             </a:fld>
             <a:endParaRPr lang="pt-BR"/>
           </a:p>
@@ -2525,7 +2525,7 @@
           <a:p>
             <a:fld id="{15B003F1-72A3-4565-B369-F67C067E940D}" type="datetimeFigureOut">
               <a:rPr lang="pt-BR" smtClean="0"/>
-              <a:t>24/04/2020</a:t>
+              <a:t>27/04/2020</a:t>
             </a:fld>
             <a:endParaRPr lang="pt-BR"/>
           </a:p>
@@ -2839,7 +2839,7 @@
           <a:p>
             <a:fld id="{15B003F1-72A3-4565-B369-F67C067E940D}" type="datetimeFigureOut">
               <a:rPr lang="pt-BR" smtClean="0"/>
-              <a:t>24/04/2020</a:t>
+              <a:t>27/04/2020</a:t>
             </a:fld>
             <a:endParaRPr lang="pt-BR"/>
           </a:p>
@@ -3130,7 +3130,7 @@
           <a:p>
             <a:fld id="{15B003F1-72A3-4565-B369-F67C067E940D}" type="datetimeFigureOut">
               <a:rPr lang="pt-BR" smtClean="0"/>
-              <a:t>24/04/2020</a:t>
+              <a:t>27/04/2020</a:t>
             </a:fld>
             <a:endParaRPr lang="pt-BR"/>
           </a:p>
@@ -3374,7 +3374,7 @@
           <a:p>
             <a:fld id="{15B003F1-72A3-4565-B369-F67C067E940D}" type="datetimeFigureOut">
               <a:rPr lang="pt-BR" smtClean="0"/>
-              <a:t>24/04/2020</a:t>
+              <a:t>27/04/2020</a:t>
             </a:fld>
             <a:endParaRPr lang="pt-BR"/>
           </a:p>
@@ -8694,6 +8694,493 @@
   <p:transition>
     <p:fade/>
   </p:transition>
+  <p:timing>
+    <p:tnLst>
+      <p:par>
+        <p:cTn id="1" dur="indefinite" restart="never" nodeType="tmRoot">
+          <p:childTnLst>
+            <p:seq concurrent="1" nextAc="seek">
+              <p:cTn id="2" dur="indefinite" nodeType="mainSeq">
+                <p:childTnLst>
+                  <p:par>
+                    <p:cTn id="3" fill="hold">
+                      <p:stCondLst>
+                        <p:cond delay="indefinite"/>
+                      </p:stCondLst>
+                      <p:childTnLst>
+                        <p:par>
+                          <p:cTn id="4" fill="hold">
+                            <p:stCondLst>
+                              <p:cond delay="0"/>
+                            </p:stCondLst>
+                            <p:childTnLst>
+                              <p:par>
+                                <p:cTn id="5" presetID="1" presetClass="entr" presetSubtype="0" fill="hold" grpId="0" nodeType="clickEffect">
+                                  <p:stCondLst>
+                                    <p:cond delay="0"/>
+                                  </p:stCondLst>
+                                  <p:childTnLst>
+                                    <p:set>
+                                      <p:cBhvr>
+                                        <p:cTn id="6" dur="1" fill="hold">
+                                          <p:stCondLst>
+                                            <p:cond delay="0"/>
+                                          </p:stCondLst>
+                                        </p:cTn>
+                                        <p:tgtEl>
+                                          <p:spTgt spid="5"/>
+                                        </p:tgtEl>
+                                        <p:attrNameLst>
+                                          <p:attrName>style.visibility</p:attrName>
+                                        </p:attrNameLst>
+                                      </p:cBhvr>
+                                      <p:to>
+                                        <p:strVal val="visible"/>
+                                      </p:to>
+                                    </p:set>
+                                  </p:childTnLst>
+                                </p:cTn>
+                              </p:par>
+                              <p:par>
+                                <p:cTn id="7" presetID="1" presetClass="entr" presetSubtype="0" fill="hold" nodeType="withEffect">
+                                  <p:stCondLst>
+                                    <p:cond delay="0"/>
+                                  </p:stCondLst>
+                                  <p:childTnLst>
+                                    <p:set>
+                                      <p:cBhvr>
+                                        <p:cTn id="8" dur="1" fill="hold">
+                                          <p:stCondLst>
+                                            <p:cond delay="0"/>
+                                          </p:stCondLst>
+                                        </p:cTn>
+                                        <p:tgtEl>
+                                          <p:spTgt spid="7"/>
+                                        </p:tgtEl>
+                                        <p:attrNameLst>
+                                          <p:attrName>style.visibility</p:attrName>
+                                        </p:attrNameLst>
+                                      </p:cBhvr>
+                                      <p:to>
+                                        <p:strVal val="visible"/>
+                                      </p:to>
+                                    </p:set>
+                                  </p:childTnLst>
+                                </p:cTn>
+                              </p:par>
+                            </p:childTnLst>
+                          </p:cTn>
+                        </p:par>
+                      </p:childTnLst>
+                    </p:cTn>
+                  </p:par>
+                  <p:par>
+                    <p:cTn id="9" fill="hold">
+                      <p:stCondLst>
+                        <p:cond delay="indefinite"/>
+                      </p:stCondLst>
+                      <p:childTnLst>
+                        <p:par>
+                          <p:cTn id="10" fill="hold">
+                            <p:stCondLst>
+                              <p:cond delay="0"/>
+                            </p:stCondLst>
+                            <p:childTnLst>
+                              <p:par>
+                                <p:cTn id="11" presetID="1" presetClass="entr" presetSubtype="0" fill="hold" nodeType="clickEffect">
+                                  <p:stCondLst>
+                                    <p:cond delay="0"/>
+                                  </p:stCondLst>
+                                  <p:childTnLst>
+                                    <p:set>
+                                      <p:cBhvr>
+                                        <p:cTn id="12" dur="1" fill="hold">
+                                          <p:stCondLst>
+                                            <p:cond delay="0"/>
+                                          </p:stCondLst>
+                                        </p:cTn>
+                                        <p:tgtEl>
+                                          <p:spTgt spid="13"/>
+                                        </p:tgtEl>
+                                        <p:attrNameLst>
+                                          <p:attrName>style.visibility</p:attrName>
+                                        </p:attrNameLst>
+                                      </p:cBhvr>
+                                      <p:to>
+                                        <p:strVal val="visible"/>
+                                      </p:to>
+                                    </p:set>
+                                  </p:childTnLst>
+                                </p:cTn>
+                              </p:par>
+                              <p:par>
+                                <p:cTn id="13" presetID="1" presetClass="entr" presetSubtype="0" fill="hold" nodeType="withEffect">
+                                  <p:stCondLst>
+                                    <p:cond delay="0"/>
+                                  </p:stCondLst>
+                                  <p:childTnLst>
+                                    <p:set>
+                                      <p:cBhvr>
+                                        <p:cTn id="14" dur="1" fill="hold">
+                                          <p:stCondLst>
+                                            <p:cond delay="0"/>
+                                          </p:stCondLst>
+                                        </p:cTn>
+                                        <p:tgtEl>
+                                          <p:spTgt spid="3"/>
+                                        </p:tgtEl>
+                                        <p:attrNameLst>
+                                          <p:attrName>style.visibility</p:attrName>
+                                        </p:attrNameLst>
+                                      </p:cBhvr>
+                                      <p:to>
+                                        <p:strVal val="visible"/>
+                                      </p:to>
+                                    </p:set>
+                                  </p:childTnLst>
+                                </p:cTn>
+                              </p:par>
+                              <p:par>
+                                <p:cTn id="15" presetID="1" presetClass="entr" presetSubtype="0" fill="hold" grpId="0" nodeType="withEffect">
+                                  <p:stCondLst>
+                                    <p:cond delay="0"/>
+                                  </p:stCondLst>
+                                  <p:childTnLst>
+                                    <p:set>
+                                      <p:cBhvr>
+                                        <p:cTn id="16" dur="1" fill="hold">
+                                          <p:stCondLst>
+                                            <p:cond delay="0"/>
+                                          </p:stCondLst>
+                                        </p:cTn>
+                                        <p:tgtEl>
+                                          <p:spTgt spid="4"/>
+                                        </p:tgtEl>
+                                        <p:attrNameLst>
+                                          <p:attrName>style.visibility</p:attrName>
+                                        </p:attrNameLst>
+                                      </p:cBhvr>
+                                      <p:to>
+                                        <p:strVal val="visible"/>
+                                      </p:to>
+                                    </p:set>
+                                  </p:childTnLst>
+                                </p:cTn>
+                              </p:par>
+                            </p:childTnLst>
+                          </p:cTn>
+                        </p:par>
+                      </p:childTnLst>
+                    </p:cTn>
+                  </p:par>
+                  <p:par>
+                    <p:cTn id="17" fill="hold">
+                      <p:stCondLst>
+                        <p:cond delay="indefinite"/>
+                      </p:stCondLst>
+                      <p:childTnLst>
+                        <p:par>
+                          <p:cTn id="18" fill="hold">
+                            <p:stCondLst>
+                              <p:cond delay="0"/>
+                            </p:stCondLst>
+                            <p:childTnLst>
+                              <p:par>
+                                <p:cTn id="19" presetID="1" presetClass="entr" presetSubtype="0" fill="hold" nodeType="clickEffect">
+                                  <p:stCondLst>
+                                    <p:cond delay="0"/>
+                                  </p:stCondLst>
+                                  <p:childTnLst>
+                                    <p:set>
+                                      <p:cBhvr>
+                                        <p:cTn id="20" dur="1" fill="hold">
+                                          <p:stCondLst>
+                                            <p:cond delay="0"/>
+                                          </p:stCondLst>
+                                        </p:cTn>
+                                        <p:tgtEl>
+                                          <p:spTgt spid="18"/>
+                                        </p:tgtEl>
+                                        <p:attrNameLst>
+                                          <p:attrName>style.visibility</p:attrName>
+                                        </p:attrNameLst>
+                                      </p:cBhvr>
+                                      <p:to>
+                                        <p:strVal val="visible"/>
+                                      </p:to>
+                                    </p:set>
+                                  </p:childTnLst>
+                                </p:cTn>
+                              </p:par>
+                              <p:par>
+                                <p:cTn id="21" presetID="1" presetClass="entr" presetSubtype="0" fill="hold" grpId="0" nodeType="withEffect">
+                                  <p:stCondLst>
+                                    <p:cond delay="0"/>
+                                  </p:stCondLst>
+                                  <p:childTnLst>
+                                    <p:set>
+                                      <p:cBhvr>
+                                        <p:cTn id="22" dur="1" fill="hold">
+                                          <p:stCondLst>
+                                            <p:cond delay="0"/>
+                                          </p:stCondLst>
+                                        </p:cTn>
+                                        <p:tgtEl>
+                                          <p:spTgt spid="6"/>
+                                        </p:tgtEl>
+                                        <p:attrNameLst>
+                                          <p:attrName>style.visibility</p:attrName>
+                                        </p:attrNameLst>
+                                      </p:cBhvr>
+                                      <p:to>
+                                        <p:strVal val="visible"/>
+                                      </p:to>
+                                    </p:set>
+                                  </p:childTnLst>
+                                </p:cTn>
+                              </p:par>
+                              <p:par>
+                                <p:cTn id="23" presetID="1" presetClass="entr" presetSubtype="0" fill="hold" nodeType="withEffect">
+                                  <p:stCondLst>
+                                    <p:cond delay="0"/>
+                                  </p:stCondLst>
+                                  <p:childTnLst>
+                                    <p:set>
+                                      <p:cBhvr>
+                                        <p:cTn id="24" dur="1" fill="hold">
+                                          <p:stCondLst>
+                                            <p:cond delay="0"/>
+                                          </p:stCondLst>
+                                        </p:cTn>
+                                        <p:tgtEl>
+                                          <p:spTgt spid="14"/>
+                                        </p:tgtEl>
+                                        <p:attrNameLst>
+                                          <p:attrName>style.visibility</p:attrName>
+                                        </p:attrNameLst>
+                                      </p:cBhvr>
+                                      <p:to>
+                                        <p:strVal val="visible"/>
+                                      </p:to>
+                                    </p:set>
+                                  </p:childTnLst>
+                                </p:cTn>
+                              </p:par>
+                            </p:childTnLst>
+                          </p:cTn>
+                        </p:par>
+                      </p:childTnLst>
+                    </p:cTn>
+                  </p:par>
+                  <p:par>
+                    <p:cTn id="25" fill="hold">
+                      <p:stCondLst>
+                        <p:cond delay="indefinite"/>
+                      </p:stCondLst>
+                      <p:childTnLst>
+                        <p:par>
+                          <p:cTn id="26" fill="hold">
+                            <p:stCondLst>
+                              <p:cond delay="0"/>
+                            </p:stCondLst>
+                            <p:childTnLst>
+                              <p:par>
+                                <p:cTn id="27" presetID="1" presetClass="entr" presetSubtype="0" fill="hold" nodeType="clickEffect">
+                                  <p:stCondLst>
+                                    <p:cond delay="0"/>
+                                  </p:stCondLst>
+                                  <p:childTnLst>
+                                    <p:set>
+                                      <p:cBhvr>
+                                        <p:cTn id="28" dur="1" fill="hold">
+                                          <p:stCondLst>
+                                            <p:cond delay="0"/>
+                                          </p:stCondLst>
+                                        </p:cTn>
+                                        <p:tgtEl>
+                                          <p:spTgt spid="21"/>
+                                        </p:tgtEl>
+                                        <p:attrNameLst>
+                                          <p:attrName>style.visibility</p:attrName>
+                                        </p:attrNameLst>
+                                      </p:cBhvr>
+                                      <p:to>
+                                        <p:strVal val="visible"/>
+                                      </p:to>
+                                    </p:set>
+                                  </p:childTnLst>
+                                </p:cTn>
+                              </p:par>
+                              <p:par>
+                                <p:cTn id="29" presetID="1" presetClass="entr" presetSubtype="0" fill="hold" nodeType="withEffect">
+                                  <p:stCondLst>
+                                    <p:cond delay="0"/>
+                                  </p:stCondLst>
+                                  <p:childTnLst>
+                                    <p:set>
+                                      <p:cBhvr>
+                                        <p:cTn id="30" dur="1" fill="hold">
+                                          <p:stCondLst>
+                                            <p:cond delay="0"/>
+                                          </p:stCondLst>
+                                        </p:cTn>
+                                        <p:tgtEl>
+                                          <p:spTgt spid="12"/>
+                                        </p:tgtEl>
+                                        <p:attrNameLst>
+                                          <p:attrName>style.visibility</p:attrName>
+                                        </p:attrNameLst>
+                                      </p:cBhvr>
+                                      <p:to>
+                                        <p:strVal val="visible"/>
+                                      </p:to>
+                                    </p:set>
+                                  </p:childTnLst>
+                                </p:cTn>
+                              </p:par>
+                              <p:par>
+                                <p:cTn id="31" presetID="1" presetClass="entr" presetSubtype="0" fill="hold" grpId="0" nodeType="withEffect">
+                                  <p:stCondLst>
+                                    <p:cond delay="0"/>
+                                  </p:stCondLst>
+                                  <p:childTnLst>
+                                    <p:set>
+                                      <p:cBhvr>
+                                        <p:cTn id="32" dur="1" fill="hold">
+                                          <p:stCondLst>
+                                            <p:cond delay="0"/>
+                                          </p:stCondLst>
+                                        </p:cTn>
+                                        <p:tgtEl>
+                                          <p:spTgt spid="11"/>
+                                        </p:tgtEl>
+                                        <p:attrNameLst>
+                                          <p:attrName>style.visibility</p:attrName>
+                                        </p:attrNameLst>
+                                      </p:cBhvr>
+                                      <p:to>
+                                        <p:strVal val="visible"/>
+                                      </p:to>
+                                    </p:set>
+                                  </p:childTnLst>
+                                </p:cTn>
+                              </p:par>
+                              <p:par>
+                                <p:cTn id="33" presetID="1" presetClass="entr" presetSubtype="0" fill="hold" nodeType="withEffect">
+                                  <p:stCondLst>
+                                    <p:cond delay="0"/>
+                                  </p:stCondLst>
+                                  <p:childTnLst>
+                                    <p:set>
+                                      <p:cBhvr>
+                                        <p:cTn id="34" dur="1" fill="hold">
+                                          <p:stCondLst>
+                                            <p:cond delay="0"/>
+                                          </p:stCondLst>
+                                        </p:cTn>
+                                        <p:tgtEl>
+                                          <p:spTgt spid="22"/>
+                                        </p:tgtEl>
+                                        <p:attrNameLst>
+                                          <p:attrName>style.visibility</p:attrName>
+                                        </p:attrNameLst>
+                                      </p:cBhvr>
+                                      <p:to>
+                                        <p:strVal val="visible"/>
+                                      </p:to>
+                                    </p:set>
+                                  </p:childTnLst>
+                                </p:cTn>
+                              </p:par>
+                              <p:par>
+                                <p:cTn id="35" presetID="1" presetClass="entr" presetSubtype="0" fill="hold" grpId="0" nodeType="withEffect">
+                                  <p:stCondLst>
+                                    <p:cond delay="0"/>
+                                  </p:stCondLst>
+                                  <p:childTnLst>
+                                    <p:set>
+                                      <p:cBhvr>
+                                        <p:cTn id="36" dur="1" fill="hold">
+                                          <p:stCondLst>
+                                            <p:cond delay="0"/>
+                                          </p:stCondLst>
+                                        </p:cTn>
+                                        <p:tgtEl>
+                                          <p:spTgt spid="10"/>
+                                        </p:tgtEl>
+                                        <p:attrNameLst>
+                                          <p:attrName>style.visibility</p:attrName>
+                                        </p:attrNameLst>
+                                      </p:cBhvr>
+                                      <p:to>
+                                        <p:strVal val="visible"/>
+                                      </p:to>
+                                    </p:set>
+                                  </p:childTnLst>
+                                </p:cTn>
+                              </p:par>
+                              <p:par>
+                                <p:cTn id="37" presetID="1" presetClass="entr" presetSubtype="0" fill="hold" nodeType="withEffect">
+                                  <p:stCondLst>
+                                    <p:cond delay="0"/>
+                                  </p:stCondLst>
+                                  <p:childTnLst>
+                                    <p:set>
+                                      <p:cBhvr>
+                                        <p:cTn id="38" dur="1" fill="hold">
+                                          <p:stCondLst>
+                                            <p:cond delay="0"/>
+                                          </p:stCondLst>
+                                        </p:cTn>
+                                        <p:tgtEl>
+                                          <p:spTgt spid="9"/>
+                                        </p:tgtEl>
+                                        <p:attrNameLst>
+                                          <p:attrName>style.visibility</p:attrName>
+                                        </p:attrNameLst>
+                                      </p:cBhvr>
+                                      <p:to>
+                                        <p:strVal val="visible"/>
+                                      </p:to>
+                                    </p:set>
+                                  </p:childTnLst>
+                                </p:cTn>
+                              </p:par>
+                            </p:childTnLst>
+                          </p:cTn>
+                        </p:par>
+                      </p:childTnLst>
+                    </p:cTn>
+                  </p:par>
+                </p:childTnLst>
+              </p:cTn>
+              <p:prevCondLst>
+                <p:cond evt="onPrev" delay="0">
+                  <p:tgtEl>
+                    <p:sldTgt/>
+                  </p:tgtEl>
+                </p:cond>
+              </p:prevCondLst>
+              <p:nextCondLst>
+                <p:cond evt="onNext" delay="0">
+                  <p:tgtEl>
+                    <p:sldTgt/>
+                  </p:tgtEl>
+                </p:cond>
+              </p:nextCondLst>
+            </p:seq>
+          </p:childTnLst>
+        </p:cTn>
+      </p:par>
+    </p:tnLst>
+    <p:bldLst>
+      <p:bldP spid="4" grpId="0"/>
+      <p:bldP spid="5" grpId="0"/>
+      <p:bldP spid="6" grpId="0"/>
+      <p:bldP spid="10" grpId="0"/>
+      <p:bldP spid="11" grpId="0"/>
+    </p:bldLst>
+  </p:timing>
 </p:sld>
 </file>
 
@@ -10485,6 +10972,1188 @@
   <p:transition>
     <p:fade/>
   </p:transition>
+  <p:timing>
+    <p:tnLst>
+      <p:par>
+        <p:cTn id="1" dur="indefinite" restart="never" nodeType="tmRoot">
+          <p:childTnLst>
+            <p:seq concurrent="1" nextAc="seek">
+              <p:cTn id="2" dur="indefinite" nodeType="mainSeq">
+                <p:childTnLst>
+                  <p:par>
+                    <p:cTn id="3" fill="hold">
+                      <p:stCondLst>
+                        <p:cond delay="indefinite"/>
+                      </p:stCondLst>
+                      <p:childTnLst>
+                        <p:par>
+                          <p:cTn id="4" fill="hold">
+                            <p:stCondLst>
+                              <p:cond delay="0"/>
+                            </p:stCondLst>
+                            <p:childTnLst>
+                              <p:par>
+                                <p:cTn id="5" presetID="1" presetClass="entr" presetSubtype="0" fill="hold" nodeType="clickEffect">
+                                  <p:stCondLst>
+                                    <p:cond delay="0"/>
+                                  </p:stCondLst>
+                                  <p:childTnLst>
+                                    <p:set>
+                                      <p:cBhvr>
+                                        <p:cTn id="6" dur="1" fill="hold">
+                                          <p:stCondLst>
+                                            <p:cond delay="0"/>
+                                          </p:stCondLst>
+                                        </p:cTn>
+                                        <p:tgtEl>
+                                          <p:spTgt spid="8"/>
+                                        </p:tgtEl>
+                                        <p:attrNameLst>
+                                          <p:attrName>style.visibility</p:attrName>
+                                        </p:attrNameLst>
+                                      </p:cBhvr>
+                                      <p:to>
+                                        <p:strVal val="visible"/>
+                                      </p:to>
+                                    </p:set>
+                                  </p:childTnLst>
+                                </p:cTn>
+                              </p:par>
+                              <p:par>
+                                <p:cTn id="7" presetID="1" presetClass="entr" presetSubtype="0" fill="hold" nodeType="withEffect">
+                                  <p:stCondLst>
+                                    <p:cond delay="0"/>
+                                  </p:stCondLst>
+                                  <p:childTnLst>
+                                    <p:set>
+                                      <p:cBhvr>
+                                        <p:cTn id="8" dur="1" fill="hold">
+                                          <p:stCondLst>
+                                            <p:cond delay="0"/>
+                                          </p:stCondLst>
+                                        </p:cTn>
+                                        <p:tgtEl>
+                                          <p:spTgt spid="31"/>
+                                        </p:tgtEl>
+                                        <p:attrNameLst>
+                                          <p:attrName>style.visibility</p:attrName>
+                                        </p:attrNameLst>
+                                      </p:cBhvr>
+                                      <p:to>
+                                        <p:strVal val="visible"/>
+                                      </p:to>
+                                    </p:set>
+                                  </p:childTnLst>
+                                </p:cTn>
+                              </p:par>
+                              <p:par>
+                                <p:cTn id="9" presetID="1" presetClass="entr" presetSubtype="0" fill="hold" nodeType="withEffect">
+                                  <p:stCondLst>
+                                    <p:cond delay="0"/>
+                                  </p:stCondLst>
+                                  <p:childTnLst>
+                                    <p:set>
+                                      <p:cBhvr>
+                                        <p:cTn id="10" dur="1" fill="hold">
+                                          <p:stCondLst>
+                                            <p:cond delay="0"/>
+                                          </p:stCondLst>
+                                        </p:cTn>
+                                        <p:tgtEl>
+                                          <p:spTgt spid="42"/>
+                                        </p:tgtEl>
+                                        <p:attrNameLst>
+                                          <p:attrName>style.visibility</p:attrName>
+                                        </p:attrNameLst>
+                                      </p:cBhvr>
+                                      <p:to>
+                                        <p:strVal val="visible"/>
+                                      </p:to>
+                                    </p:set>
+                                  </p:childTnLst>
+                                </p:cTn>
+                              </p:par>
+                              <p:par>
+                                <p:cTn id="11" presetID="1" presetClass="entr" presetSubtype="0" fill="hold" grpId="0" nodeType="withEffect">
+                                  <p:stCondLst>
+                                    <p:cond delay="0"/>
+                                  </p:stCondLst>
+                                  <p:childTnLst>
+                                    <p:set>
+                                      <p:cBhvr>
+                                        <p:cTn id="12" dur="1" fill="hold">
+                                          <p:stCondLst>
+                                            <p:cond delay="0"/>
+                                          </p:stCondLst>
+                                        </p:cTn>
+                                        <p:tgtEl>
+                                          <p:spTgt spid="34"/>
+                                        </p:tgtEl>
+                                        <p:attrNameLst>
+                                          <p:attrName>style.visibility</p:attrName>
+                                        </p:attrNameLst>
+                                      </p:cBhvr>
+                                      <p:to>
+                                        <p:strVal val="visible"/>
+                                      </p:to>
+                                    </p:set>
+                                  </p:childTnLst>
+                                </p:cTn>
+                              </p:par>
+                              <p:par>
+                                <p:cTn id="13" presetID="1" presetClass="entr" presetSubtype="0" fill="hold" nodeType="withEffect">
+                                  <p:stCondLst>
+                                    <p:cond delay="0"/>
+                                  </p:stCondLst>
+                                  <p:childTnLst>
+                                    <p:set>
+                                      <p:cBhvr>
+                                        <p:cTn id="14" dur="1" fill="hold">
+                                          <p:stCondLst>
+                                            <p:cond delay="0"/>
+                                          </p:stCondLst>
+                                        </p:cTn>
+                                        <p:tgtEl>
+                                          <p:spTgt spid="15"/>
+                                        </p:tgtEl>
+                                        <p:attrNameLst>
+                                          <p:attrName>style.visibility</p:attrName>
+                                        </p:attrNameLst>
+                                      </p:cBhvr>
+                                      <p:to>
+                                        <p:strVal val="visible"/>
+                                      </p:to>
+                                    </p:set>
+                                  </p:childTnLst>
+                                </p:cTn>
+                              </p:par>
+                              <p:par>
+                                <p:cTn id="15" presetID="1" presetClass="entr" presetSubtype="0" fill="hold" grpId="0" nodeType="withEffect">
+                                  <p:stCondLst>
+                                    <p:cond delay="0"/>
+                                  </p:stCondLst>
+                                  <p:childTnLst>
+                                    <p:set>
+                                      <p:cBhvr>
+                                        <p:cTn id="16" dur="1" fill="hold">
+                                          <p:stCondLst>
+                                            <p:cond delay="0"/>
+                                          </p:stCondLst>
+                                        </p:cTn>
+                                        <p:tgtEl>
+                                          <p:spTgt spid="51"/>
+                                        </p:tgtEl>
+                                        <p:attrNameLst>
+                                          <p:attrName>style.visibility</p:attrName>
+                                        </p:attrNameLst>
+                                      </p:cBhvr>
+                                      <p:to>
+                                        <p:strVal val="visible"/>
+                                      </p:to>
+                                    </p:set>
+                                  </p:childTnLst>
+                                </p:cTn>
+                              </p:par>
+                              <p:par>
+                                <p:cTn id="17" presetID="1" presetClass="entr" presetSubtype="0" fill="hold" nodeType="withEffect">
+                                  <p:stCondLst>
+                                    <p:cond delay="0"/>
+                                  </p:stCondLst>
+                                  <p:childTnLst>
+                                    <p:set>
+                                      <p:cBhvr>
+                                        <p:cTn id="18" dur="1" fill="hold">
+                                          <p:stCondLst>
+                                            <p:cond delay="0"/>
+                                          </p:stCondLst>
+                                        </p:cTn>
+                                        <p:tgtEl>
+                                          <p:spTgt spid="17"/>
+                                        </p:tgtEl>
+                                        <p:attrNameLst>
+                                          <p:attrName>style.visibility</p:attrName>
+                                        </p:attrNameLst>
+                                      </p:cBhvr>
+                                      <p:to>
+                                        <p:strVal val="visible"/>
+                                      </p:to>
+                                    </p:set>
+                                  </p:childTnLst>
+                                </p:cTn>
+                              </p:par>
+                              <p:par>
+                                <p:cTn id="19" presetID="1" presetClass="entr" presetSubtype="0" fill="hold" grpId="0" nodeType="withEffect">
+                                  <p:stCondLst>
+                                    <p:cond delay="0"/>
+                                  </p:stCondLst>
+                                  <p:childTnLst>
+                                    <p:set>
+                                      <p:cBhvr>
+                                        <p:cTn id="20" dur="1" fill="hold">
+                                          <p:stCondLst>
+                                            <p:cond delay="0"/>
+                                          </p:stCondLst>
+                                        </p:cTn>
+                                        <p:tgtEl>
+                                          <p:spTgt spid="50"/>
+                                        </p:tgtEl>
+                                        <p:attrNameLst>
+                                          <p:attrName>style.visibility</p:attrName>
+                                        </p:attrNameLst>
+                                      </p:cBhvr>
+                                      <p:to>
+                                        <p:strVal val="visible"/>
+                                      </p:to>
+                                    </p:set>
+                                  </p:childTnLst>
+                                </p:cTn>
+                              </p:par>
+                              <p:par>
+                                <p:cTn id="21" presetID="1" presetClass="entr" presetSubtype="0" fill="hold" nodeType="withEffect">
+                                  <p:stCondLst>
+                                    <p:cond delay="0"/>
+                                  </p:stCondLst>
+                                  <p:childTnLst>
+                                    <p:set>
+                                      <p:cBhvr>
+                                        <p:cTn id="22" dur="1" fill="hold">
+                                          <p:stCondLst>
+                                            <p:cond delay="0"/>
+                                          </p:stCondLst>
+                                        </p:cTn>
+                                        <p:tgtEl>
+                                          <p:spTgt spid="20"/>
+                                        </p:tgtEl>
+                                        <p:attrNameLst>
+                                          <p:attrName>style.visibility</p:attrName>
+                                        </p:attrNameLst>
+                                      </p:cBhvr>
+                                      <p:to>
+                                        <p:strVal val="visible"/>
+                                      </p:to>
+                                    </p:set>
+                                  </p:childTnLst>
+                                </p:cTn>
+                              </p:par>
+                              <p:par>
+                                <p:cTn id="23" presetID="1" presetClass="entr" presetSubtype="0" fill="hold" grpId="0" nodeType="withEffect">
+                                  <p:stCondLst>
+                                    <p:cond delay="0"/>
+                                  </p:stCondLst>
+                                  <p:childTnLst>
+                                    <p:set>
+                                      <p:cBhvr>
+                                        <p:cTn id="24" dur="1" fill="hold">
+                                          <p:stCondLst>
+                                            <p:cond delay="0"/>
+                                          </p:stCondLst>
+                                        </p:cTn>
+                                        <p:tgtEl>
+                                          <p:spTgt spid="49"/>
+                                        </p:tgtEl>
+                                        <p:attrNameLst>
+                                          <p:attrName>style.visibility</p:attrName>
+                                        </p:attrNameLst>
+                                      </p:cBhvr>
+                                      <p:to>
+                                        <p:strVal val="visible"/>
+                                      </p:to>
+                                    </p:set>
+                                  </p:childTnLst>
+                                </p:cTn>
+                              </p:par>
+                              <p:par>
+                                <p:cTn id="25" presetID="1" presetClass="entr" presetSubtype="0" fill="hold" nodeType="withEffect">
+                                  <p:stCondLst>
+                                    <p:cond delay="0"/>
+                                  </p:stCondLst>
+                                  <p:childTnLst>
+                                    <p:set>
+                                      <p:cBhvr>
+                                        <p:cTn id="26" dur="1" fill="hold">
+                                          <p:stCondLst>
+                                            <p:cond delay="0"/>
+                                          </p:stCondLst>
+                                        </p:cTn>
+                                        <p:tgtEl>
+                                          <p:spTgt spid="11"/>
+                                        </p:tgtEl>
+                                        <p:attrNameLst>
+                                          <p:attrName>style.visibility</p:attrName>
+                                        </p:attrNameLst>
+                                      </p:cBhvr>
+                                      <p:to>
+                                        <p:strVal val="visible"/>
+                                      </p:to>
+                                    </p:set>
+                                  </p:childTnLst>
+                                </p:cTn>
+                              </p:par>
+                              <p:par>
+                                <p:cTn id="27" presetID="1" presetClass="entr" presetSubtype="0" fill="hold" nodeType="withEffect">
+                                  <p:stCondLst>
+                                    <p:cond delay="0"/>
+                                  </p:stCondLst>
+                                  <p:childTnLst>
+                                    <p:set>
+                                      <p:cBhvr>
+                                        <p:cTn id="28" dur="1" fill="hold">
+                                          <p:stCondLst>
+                                            <p:cond delay="0"/>
+                                          </p:stCondLst>
+                                        </p:cTn>
+                                        <p:tgtEl>
+                                          <p:spTgt spid="46"/>
+                                        </p:tgtEl>
+                                        <p:attrNameLst>
+                                          <p:attrName>style.visibility</p:attrName>
+                                        </p:attrNameLst>
+                                      </p:cBhvr>
+                                      <p:to>
+                                        <p:strVal val="visible"/>
+                                      </p:to>
+                                    </p:set>
+                                  </p:childTnLst>
+                                </p:cTn>
+                              </p:par>
+                              <p:par>
+                                <p:cTn id="29" presetID="1" presetClass="entr" presetSubtype="0" fill="hold" grpId="0" nodeType="withEffect">
+                                  <p:stCondLst>
+                                    <p:cond delay="0"/>
+                                  </p:stCondLst>
+                                  <p:childTnLst>
+                                    <p:set>
+                                      <p:cBhvr>
+                                        <p:cTn id="30" dur="1" fill="hold">
+                                          <p:stCondLst>
+                                            <p:cond delay="0"/>
+                                          </p:stCondLst>
+                                        </p:cTn>
+                                        <p:tgtEl>
+                                          <p:spTgt spid="48"/>
+                                        </p:tgtEl>
+                                        <p:attrNameLst>
+                                          <p:attrName>style.visibility</p:attrName>
+                                        </p:attrNameLst>
+                                      </p:cBhvr>
+                                      <p:to>
+                                        <p:strVal val="visible"/>
+                                      </p:to>
+                                    </p:set>
+                                  </p:childTnLst>
+                                </p:cTn>
+                              </p:par>
+                              <p:par>
+                                <p:cTn id="31" presetID="1" presetClass="entr" presetSubtype="0" fill="hold" nodeType="withEffect">
+                                  <p:stCondLst>
+                                    <p:cond delay="0"/>
+                                  </p:stCondLst>
+                                  <p:childTnLst>
+                                    <p:set>
+                                      <p:cBhvr>
+                                        <p:cTn id="32" dur="1" fill="hold">
+                                          <p:stCondLst>
+                                            <p:cond delay="0"/>
+                                          </p:stCondLst>
+                                        </p:cTn>
+                                        <p:tgtEl>
+                                          <p:spTgt spid="44"/>
+                                        </p:tgtEl>
+                                        <p:attrNameLst>
+                                          <p:attrName>style.visibility</p:attrName>
+                                        </p:attrNameLst>
+                                      </p:cBhvr>
+                                      <p:to>
+                                        <p:strVal val="visible"/>
+                                      </p:to>
+                                    </p:set>
+                                  </p:childTnLst>
+                                </p:cTn>
+                              </p:par>
+                              <p:par>
+                                <p:cTn id="33" presetID="1" presetClass="entr" presetSubtype="0" fill="hold" grpId="0" nodeType="withEffect">
+                                  <p:stCondLst>
+                                    <p:cond delay="0"/>
+                                  </p:stCondLst>
+                                  <p:childTnLst>
+                                    <p:set>
+                                      <p:cBhvr>
+                                        <p:cTn id="34" dur="1" fill="hold">
+                                          <p:stCondLst>
+                                            <p:cond delay="0"/>
+                                          </p:stCondLst>
+                                        </p:cTn>
+                                        <p:tgtEl>
+                                          <p:spTgt spid="47"/>
+                                        </p:tgtEl>
+                                        <p:attrNameLst>
+                                          <p:attrName>style.visibility</p:attrName>
+                                        </p:attrNameLst>
+                                      </p:cBhvr>
+                                      <p:to>
+                                        <p:strVal val="visible"/>
+                                      </p:to>
+                                    </p:set>
+                                  </p:childTnLst>
+                                </p:cTn>
+                              </p:par>
+                            </p:childTnLst>
+                          </p:cTn>
+                        </p:par>
+                      </p:childTnLst>
+                    </p:cTn>
+                  </p:par>
+                  <p:par>
+                    <p:cTn id="35" fill="hold">
+                      <p:stCondLst>
+                        <p:cond delay="indefinite"/>
+                      </p:stCondLst>
+                      <p:childTnLst>
+                        <p:par>
+                          <p:cTn id="36" fill="hold">
+                            <p:stCondLst>
+                              <p:cond delay="0"/>
+                            </p:stCondLst>
+                            <p:childTnLst>
+                              <p:par>
+                                <p:cTn id="37" presetID="1" presetClass="entr" presetSubtype="0" fill="hold" nodeType="clickEffect">
+                                  <p:stCondLst>
+                                    <p:cond delay="0"/>
+                                  </p:stCondLst>
+                                  <p:childTnLst>
+                                    <p:set>
+                                      <p:cBhvr>
+                                        <p:cTn id="38" dur="1" fill="hold">
+                                          <p:stCondLst>
+                                            <p:cond delay="0"/>
+                                          </p:stCondLst>
+                                        </p:cTn>
+                                        <p:tgtEl>
+                                          <p:spTgt spid="40"/>
+                                        </p:tgtEl>
+                                        <p:attrNameLst>
+                                          <p:attrName>style.visibility</p:attrName>
+                                        </p:attrNameLst>
+                                      </p:cBhvr>
+                                      <p:to>
+                                        <p:strVal val="visible"/>
+                                      </p:to>
+                                    </p:set>
+                                  </p:childTnLst>
+                                </p:cTn>
+                              </p:par>
+                              <p:par>
+                                <p:cTn id="39" presetID="1" presetClass="entr" presetSubtype="0" fill="hold" grpId="0" nodeType="withEffect">
+                                  <p:stCondLst>
+                                    <p:cond delay="0"/>
+                                  </p:stCondLst>
+                                  <p:childTnLst>
+                                    <p:set>
+                                      <p:cBhvr>
+                                        <p:cTn id="40" dur="1" fill="hold">
+                                          <p:stCondLst>
+                                            <p:cond delay="0"/>
+                                          </p:stCondLst>
+                                        </p:cTn>
+                                        <p:tgtEl>
+                                          <p:spTgt spid="38"/>
+                                        </p:tgtEl>
+                                        <p:attrNameLst>
+                                          <p:attrName>style.visibility</p:attrName>
+                                        </p:attrNameLst>
+                                      </p:cBhvr>
+                                      <p:to>
+                                        <p:strVal val="visible"/>
+                                      </p:to>
+                                    </p:set>
+                                  </p:childTnLst>
+                                </p:cTn>
+                              </p:par>
+                              <p:par>
+                                <p:cTn id="41" presetID="1" presetClass="entr" presetSubtype="0" fill="hold" nodeType="withEffect">
+                                  <p:stCondLst>
+                                    <p:cond delay="0"/>
+                                  </p:stCondLst>
+                                  <p:childTnLst>
+                                    <p:set>
+                                      <p:cBhvr>
+                                        <p:cTn id="42" dur="1" fill="hold">
+                                          <p:stCondLst>
+                                            <p:cond delay="0"/>
+                                          </p:stCondLst>
+                                        </p:cTn>
+                                        <p:tgtEl>
+                                          <p:spTgt spid="6"/>
+                                        </p:tgtEl>
+                                        <p:attrNameLst>
+                                          <p:attrName>style.visibility</p:attrName>
+                                        </p:attrNameLst>
+                                      </p:cBhvr>
+                                      <p:to>
+                                        <p:strVal val="visible"/>
+                                      </p:to>
+                                    </p:set>
+                                  </p:childTnLst>
+                                </p:cTn>
+                              </p:par>
+                              <p:par>
+                                <p:cTn id="43" presetID="1" presetClass="entr" presetSubtype="0" fill="hold" grpId="0" nodeType="withEffect">
+                                  <p:stCondLst>
+                                    <p:cond delay="0"/>
+                                  </p:stCondLst>
+                                  <p:childTnLst>
+                                    <p:set>
+                                      <p:cBhvr>
+                                        <p:cTn id="44" dur="1" fill="hold">
+                                          <p:stCondLst>
+                                            <p:cond delay="0"/>
+                                          </p:stCondLst>
+                                        </p:cTn>
+                                        <p:tgtEl>
+                                          <p:spTgt spid="36"/>
+                                        </p:tgtEl>
+                                        <p:attrNameLst>
+                                          <p:attrName>style.visibility</p:attrName>
+                                        </p:attrNameLst>
+                                      </p:cBhvr>
+                                      <p:to>
+                                        <p:strVal val="visible"/>
+                                      </p:to>
+                                    </p:set>
+                                  </p:childTnLst>
+                                </p:cTn>
+                              </p:par>
+                              <p:par>
+                                <p:cTn id="45" presetID="1" presetClass="entr" presetSubtype="0" fill="hold" grpId="0" nodeType="withEffect">
+                                  <p:stCondLst>
+                                    <p:cond delay="0"/>
+                                  </p:stCondLst>
+                                  <p:childTnLst>
+                                    <p:set>
+                                      <p:cBhvr>
+                                        <p:cTn id="46" dur="1" fill="hold">
+                                          <p:stCondLst>
+                                            <p:cond delay="0"/>
+                                          </p:stCondLst>
+                                        </p:cTn>
+                                        <p:tgtEl>
+                                          <p:spTgt spid="33"/>
+                                        </p:tgtEl>
+                                        <p:attrNameLst>
+                                          <p:attrName>style.visibility</p:attrName>
+                                        </p:attrNameLst>
+                                      </p:cBhvr>
+                                      <p:to>
+                                        <p:strVal val="visible"/>
+                                      </p:to>
+                                    </p:set>
+                                  </p:childTnLst>
+                                </p:cTn>
+                              </p:par>
+                              <p:par>
+                                <p:cTn id="47" presetID="1" presetClass="entr" presetSubtype="0" fill="hold" nodeType="withEffect">
+                                  <p:stCondLst>
+                                    <p:cond delay="0"/>
+                                  </p:stCondLst>
+                                  <p:childTnLst>
+                                    <p:set>
+                                      <p:cBhvr>
+                                        <p:cTn id="48" dur="1" fill="hold">
+                                          <p:stCondLst>
+                                            <p:cond delay="0"/>
+                                          </p:stCondLst>
+                                        </p:cTn>
+                                        <p:tgtEl>
+                                          <p:spTgt spid="41"/>
+                                        </p:tgtEl>
+                                        <p:attrNameLst>
+                                          <p:attrName>style.visibility</p:attrName>
+                                        </p:attrNameLst>
+                                      </p:cBhvr>
+                                      <p:to>
+                                        <p:strVal val="visible"/>
+                                      </p:to>
+                                    </p:set>
+                                  </p:childTnLst>
+                                </p:cTn>
+                              </p:par>
+                              <p:par>
+                                <p:cTn id="49" presetID="1" presetClass="entr" presetSubtype="0" fill="hold" nodeType="withEffect">
+                                  <p:stCondLst>
+                                    <p:cond delay="0"/>
+                                  </p:stCondLst>
+                                  <p:childTnLst>
+                                    <p:set>
+                                      <p:cBhvr>
+                                        <p:cTn id="50" dur="1" fill="hold">
+                                          <p:stCondLst>
+                                            <p:cond delay="0"/>
+                                          </p:stCondLst>
+                                        </p:cTn>
+                                        <p:tgtEl>
+                                          <p:spTgt spid="4"/>
+                                        </p:tgtEl>
+                                        <p:attrNameLst>
+                                          <p:attrName>style.visibility</p:attrName>
+                                        </p:attrNameLst>
+                                      </p:cBhvr>
+                                      <p:to>
+                                        <p:strVal val="visible"/>
+                                      </p:to>
+                                    </p:set>
+                                  </p:childTnLst>
+                                </p:cTn>
+                              </p:par>
+                              <p:par>
+                                <p:cTn id="51" presetID="1" presetClass="entr" presetSubtype="0" fill="hold" grpId="0" nodeType="withEffect">
+                                  <p:stCondLst>
+                                    <p:cond delay="0"/>
+                                  </p:stCondLst>
+                                  <p:childTnLst>
+                                    <p:set>
+                                      <p:cBhvr>
+                                        <p:cTn id="52" dur="1" fill="hold">
+                                          <p:stCondLst>
+                                            <p:cond delay="0"/>
+                                          </p:stCondLst>
+                                        </p:cTn>
+                                        <p:tgtEl>
+                                          <p:spTgt spid="37"/>
+                                        </p:tgtEl>
+                                        <p:attrNameLst>
+                                          <p:attrName>style.visibility</p:attrName>
+                                        </p:attrNameLst>
+                                      </p:cBhvr>
+                                      <p:to>
+                                        <p:strVal val="visible"/>
+                                      </p:to>
+                                    </p:set>
+                                  </p:childTnLst>
+                                </p:cTn>
+                              </p:par>
+                              <p:par>
+                                <p:cTn id="53" presetID="1" presetClass="entr" presetSubtype="0" fill="hold" nodeType="withEffect">
+                                  <p:stCondLst>
+                                    <p:cond delay="0"/>
+                                  </p:stCondLst>
+                                  <p:childTnLst>
+                                    <p:set>
+                                      <p:cBhvr>
+                                        <p:cTn id="54" dur="1" fill="hold">
+                                          <p:stCondLst>
+                                            <p:cond delay="0"/>
+                                          </p:stCondLst>
+                                        </p:cTn>
+                                        <p:tgtEl>
+                                          <p:spTgt spid="2"/>
+                                        </p:tgtEl>
+                                        <p:attrNameLst>
+                                          <p:attrName>style.visibility</p:attrName>
+                                        </p:attrNameLst>
+                                      </p:cBhvr>
+                                      <p:to>
+                                        <p:strVal val="visible"/>
+                                      </p:to>
+                                    </p:set>
+                                  </p:childTnLst>
+                                </p:cTn>
+                              </p:par>
+                              <p:par>
+                                <p:cTn id="55" presetID="1" presetClass="entr" presetSubtype="0" fill="hold" grpId="0" nodeType="withEffect">
+                                  <p:stCondLst>
+                                    <p:cond delay="0"/>
+                                  </p:stCondLst>
+                                  <p:childTnLst>
+                                    <p:set>
+                                      <p:cBhvr>
+                                        <p:cTn id="56" dur="1" fill="hold">
+                                          <p:stCondLst>
+                                            <p:cond delay="0"/>
+                                          </p:stCondLst>
+                                        </p:cTn>
+                                        <p:tgtEl>
+                                          <p:spTgt spid="39"/>
+                                        </p:tgtEl>
+                                        <p:attrNameLst>
+                                          <p:attrName>style.visibility</p:attrName>
+                                        </p:attrNameLst>
+                                      </p:cBhvr>
+                                      <p:to>
+                                        <p:strVal val="visible"/>
+                                      </p:to>
+                                    </p:set>
+                                  </p:childTnLst>
+                                </p:cTn>
+                              </p:par>
+                              <p:par>
+                                <p:cTn id="57" presetID="1" presetClass="entr" presetSubtype="0" fill="hold" nodeType="withEffect">
+                                  <p:stCondLst>
+                                    <p:cond delay="0"/>
+                                  </p:stCondLst>
+                                  <p:childTnLst>
+                                    <p:set>
+                                      <p:cBhvr>
+                                        <p:cTn id="58" dur="1" fill="hold">
+                                          <p:stCondLst>
+                                            <p:cond delay="0"/>
+                                          </p:stCondLst>
+                                        </p:cTn>
+                                        <p:tgtEl>
+                                          <p:spTgt spid="45"/>
+                                        </p:tgtEl>
+                                        <p:attrNameLst>
+                                          <p:attrName>style.visibility</p:attrName>
+                                        </p:attrNameLst>
+                                      </p:cBhvr>
+                                      <p:to>
+                                        <p:strVal val="visible"/>
+                                      </p:to>
+                                    </p:set>
+                                  </p:childTnLst>
+                                </p:cTn>
+                              </p:par>
+                            </p:childTnLst>
+                          </p:cTn>
+                        </p:par>
+                      </p:childTnLst>
+                    </p:cTn>
+                  </p:par>
+                  <p:par>
+                    <p:cTn id="59" fill="hold">
+                      <p:stCondLst>
+                        <p:cond delay="indefinite"/>
+                      </p:stCondLst>
+                      <p:childTnLst>
+                        <p:par>
+                          <p:cTn id="60" fill="hold">
+                            <p:stCondLst>
+                              <p:cond delay="0"/>
+                            </p:stCondLst>
+                            <p:childTnLst>
+                              <p:par>
+                                <p:cTn id="61" presetID="1" presetClass="entr" presetSubtype="0" fill="hold" grpId="0" nodeType="clickEffect">
+                                  <p:stCondLst>
+                                    <p:cond delay="0"/>
+                                  </p:stCondLst>
+                                  <p:childTnLst>
+                                    <p:set>
+                                      <p:cBhvr>
+                                        <p:cTn id="62" dur="1" fill="hold">
+                                          <p:stCondLst>
+                                            <p:cond delay="0"/>
+                                          </p:stCondLst>
+                                        </p:cTn>
+                                        <p:tgtEl>
+                                          <p:spTgt spid="35"/>
+                                        </p:tgtEl>
+                                        <p:attrNameLst>
+                                          <p:attrName>style.visibility</p:attrName>
+                                        </p:attrNameLst>
+                                      </p:cBhvr>
+                                      <p:to>
+                                        <p:strVal val="visible"/>
+                                      </p:to>
+                                    </p:set>
+                                  </p:childTnLst>
+                                </p:cTn>
+                              </p:par>
+                              <p:par>
+                                <p:cTn id="63" presetID="1" presetClass="entr" presetSubtype="0" fill="hold" nodeType="withEffect">
+                                  <p:stCondLst>
+                                    <p:cond delay="0"/>
+                                  </p:stCondLst>
+                                  <p:childTnLst>
+                                    <p:set>
+                                      <p:cBhvr>
+                                        <p:cTn id="64" dur="1" fill="hold">
+                                          <p:stCondLst>
+                                            <p:cond delay="0"/>
+                                          </p:stCondLst>
+                                        </p:cTn>
+                                        <p:tgtEl>
+                                          <p:spTgt spid="22"/>
+                                        </p:tgtEl>
+                                        <p:attrNameLst>
+                                          <p:attrName>style.visibility</p:attrName>
+                                        </p:attrNameLst>
+                                      </p:cBhvr>
+                                      <p:to>
+                                        <p:strVal val="visible"/>
+                                      </p:to>
+                                    </p:set>
+                                  </p:childTnLst>
+                                </p:cTn>
+                              </p:par>
+                              <p:par>
+                                <p:cTn id="65" presetID="1" presetClass="entr" presetSubtype="0" fill="hold" nodeType="withEffect">
+                                  <p:stCondLst>
+                                    <p:cond delay="0"/>
+                                  </p:stCondLst>
+                                  <p:childTnLst>
+                                    <p:set>
+                                      <p:cBhvr>
+                                        <p:cTn id="66" dur="1" fill="hold">
+                                          <p:stCondLst>
+                                            <p:cond delay="0"/>
+                                          </p:stCondLst>
+                                        </p:cTn>
+                                        <p:tgtEl>
+                                          <p:spTgt spid="43"/>
+                                        </p:tgtEl>
+                                        <p:attrNameLst>
+                                          <p:attrName>style.visibility</p:attrName>
+                                        </p:attrNameLst>
+                                      </p:cBhvr>
+                                      <p:to>
+                                        <p:strVal val="visible"/>
+                                      </p:to>
+                                    </p:set>
+                                  </p:childTnLst>
+                                </p:cTn>
+                              </p:par>
+                              <p:par>
+                                <p:cTn id="67" presetID="1" presetClass="entr" presetSubtype="0" fill="hold" nodeType="withEffect">
+                                  <p:stCondLst>
+                                    <p:cond delay="0"/>
+                                  </p:stCondLst>
+                                  <p:childTnLst>
+                                    <p:set>
+                                      <p:cBhvr>
+                                        <p:cTn id="68" dur="1" fill="hold">
+                                          <p:stCondLst>
+                                            <p:cond delay="0"/>
+                                          </p:stCondLst>
+                                        </p:cTn>
+                                        <p:tgtEl>
+                                          <p:spTgt spid="23"/>
+                                        </p:tgtEl>
+                                        <p:attrNameLst>
+                                          <p:attrName>style.visibility</p:attrName>
+                                        </p:attrNameLst>
+                                      </p:cBhvr>
+                                      <p:to>
+                                        <p:strVal val="visible"/>
+                                      </p:to>
+                                    </p:set>
+                                  </p:childTnLst>
+                                </p:cTn>
+                              </p:par>
+                              <p:par>
+                                <p:cTn id="69" presetID="1" presetClass="entr" presetSubtype="0" fill="hold" grpId="0" nodeType="withEffect">
+                                  <p:stCondLst>
+                                    <p:cond delay="0"/>
+                                  </p:stCondLst>
+                                  <p:childTnLst>
+                                    <p:set>
+                                      <p:cBhvr>
+                                        <p:cTn id="70" dur="1" fill="hold">
+                                          <p:stCondLst>
+                                            <p:cond delay="0"/>
+                                          </p:stCondLst>
+                                        </p:cTn>
+                                        <p:tgtEl>
+                                          <p:spTgt spid="52"/>
+                                        </p:tgtEl>
+                                        <p:attrNameLst>
+                                          <p:attrName>style.visibility</p:attrName>
+                                        </p:attrNameLst>
+                                      </p:cBhvr>
+                                      <p:to>
+                                        <p:strVal val="visible"/>
+                                      </p:to>
+                                    </p:set>
+                                  </p:childTnLst>
+                                </p:cTn>
+                              </p:par>
+                              <p:par>
+                                <p:cTn id="71" presetID="1" presetClass="entr" presetSubtype="0" fill="hold" nodeType="withEffect">
+                                  <p:stCondLst>
+                                    <p:cond delay="0"/>
+                                  </p:stCondLst>
+                                  <p:childTnLst>
+                                    <p:set>
+                                      <p:cBhvr>
+                                        <p:cTn id="72" dur="1" fill="hold">
+                                          <p:stCondLst>
+                                            <p:cond delay="0"/>
+                                          </p:stCondLst>
+                                        </p:cTn>
+                                        <p:tgtEl>
+                                          <p:spTgt spid="3"/>
+                                        </p:tgtEl>
+                                        <p:attrNameLst>
+                                          <p:attrName>style.visibility</p:attrName>
+                                        </p:attrNameLst>
+                                      </p:cBhvr>
+                                      <p:to>
+                                        <p:strVal val="visible"/>
+                                      </p:to>
+                                    </p:set>
+                                  </p:childTnLst>
+                                </p:cTn>
+                              </p:par>
+                              <p:par>
+                                <p:cTn id="73" presetID="1" presetClass="entr" presetSubtype="0" fill="hold" grpId="0" nodeType="withEffect">
+                                  <p:stCondLst>
+                                    <p:cond delay="0"/>
+                                  </p:stCondLst>
+                                  <p:childTnLst>
+                                    <p:set>
+                                      <p:cBhvr>
+                                        <p:cTn id="74" dur="1" fill="hold">
+                                          <p:stCondLst>
+                                            <p:cond delay="0"/>
+                                          </p:stCondLst>
+                                        </p:cTn>
+                                        <p:tgtEl>
+                                          <p:spTgt spid="54"/>
+                                        </p:tgtEl>
+                                        <p:attrNameLst>
+                                          <p:attrName>style.visibility</p:attrName>
+                                        </p:attrNameLst>
+                                      </p:cBhvr>
+                                      <p:to>
+                                        <p:strVal val="visible"/>
+                                      </p:to>
+                                    </p:set>
+                                  </p:childTnLst>
+                                </p:cTn>
+                              </p:par>
+                              <p:par>
+                                <p:cTn id="75" presetID="1" presetClass="entr" presetSubtype="0" fill="hold" nodeType="withEffect">
+                                  <p:stCondLst>
+                                    <p:cond delay="0"/>
+                                  </p:stCondLst>
+                                  <p:childTnLst>
+                                    <p:set>
+                                      <p:cBhvr>
+                                        <p:cTn id="76" dur="1" fill="hold">
+                                          <p:stCondLst>
+                                            <p:cond delay="0"/>
+                                          </p:stCondLst>
+                                        </p:cTn>
+                                        <p:tgtEl>
+                                          <p:spTgt spid="7"/>
+                                        </p:tgtEl>
+                                        <p:attrNameLst>
+                                          <p:attrName>style.visibility</p:attrName>
+                                        </p:attrNameLst>
+                                      </p:cBhvr>
+                                      <p:to>
+                                        <p:strVal val="visible"/>
+                                      </p:to>
+                                    </p:set>
+                                  </p:childTnLst>
+                                </p:cTn>
+                              </p:par>
+                              <p:par>
+                                <p:cTn id="77" presetID="1" presetClass="entr" presetSubtype="0" fill="hold" nodeType="withEffect">
+                                  <p:stCondLst>
+                                    <p:cond delay="0"/>
+                                  </p:stCondLst>
+                                  <p:childTnLst>
+                                    <p:set>
+                                      <p:cBhvr>
+                                        <p:cTn id="78" dur="1" fill="hold">
+                                          <p:stCondLst>
+                                            <p:cond delay="0"/>
+                                          </p:stCondLst>
+                                        </p:cTn>
+                                        <p:tgtEl>
+                                          <p:spTgt spid="10"/>
+                                        </p:tgtEl>
+                                        <p:attrNameLst>
+                                          <p:attrName>style.visibility</p:attrName>
+                                        </p:attrNameLst>
+                                      </p:cBhvr>
+                                      <p:to>
+                                        <p:strVal val="visible"/>
+                                      </p:to>
+                                    </p:set>
+                                  </p:childTnLst>
+                                </p:cTn>
+                              </p:par>
+                              <p:par>
+                                <p:cTn id="79" presetID="1" presetClass="entr" presetSubtype="0" fill="hold" grpId="0" nodeType="withEffect">
+                                  <p:stCondLst>
+                                    <p:cond delay="0"/>
+                                  </p:stCondLst>
+                                  <p:childTnLst>
+                                    <p:set>
+                                      <p:cBhvr>
+                                        <p:cTn id="80" dur="1" fill="hold">
+                                          <p:stCondLst>
+                                            <p:cond delay="0"/>
+                                          </p:stCondLst>
+                                        </p:cTn>
+                                        <p:tgtEl>
+                                          <p:spTgt spid="5"/>
+                                        </p:tgtEl>
+                                        <p:attrNameLst>
+                                          <p:attrName>style.visibility</p:attrName>
+                                        </p:attrNameLst>
+                                      </p:cBhvr>
+                                      <p:to>
+                                        <p:strVal val="visible"/>
+                                      </p:to>
+                                    </p:set>
+                                  </p:childTnLst>
+                                </p:cTn>
+                              </p:par>
+                              <p:par>
+                                <p:cTn id="81" presetID="1" presetClass="entr" presetSubtype="0" fill="hold" nodeType="withEffect">
+                                  <p:stCondLst>
+                                    <p:cond delay="0"/>
+                                  </p:stCondLst>
+                                  <p:childTnLst>
+                                    <p:set>
+                                      <p:cBhvr>
+                                        <p:cTn id="82" dur="1" fill="hold">
+                                          <p:stCondLst>
+                                            <p:cond delay="0"/>
+                                          </p:stCondLst>
+                                        </p:cTn>
+                                        <p:tgtEl>
+                                          <p:spTgt spid="30"/>
+                                        </p:tgtEl>
+                                        <p:attrNameLst>
+                                          <p:attrName>style.visibility</p:attrName>
+                                        </p:attrNameLst>
+                                      </p:cBhvr>
+                                      <p:to>
+                                        <p:strVal val="visible"/>
+                                      </p:to>
+                                    </p:set>
+                                  </p:childTnLst>
+                                </p:cTn>
+                              </p:par>
+                              <p:par>
+                                <p:cTn id="83" presetID="1" presetClass="entr" presetSubtype="0" fill="hold" nodeType="withEffect">
+                                  <p:stCondLst>
+                                    <p:cond delay="0"/>
+                                  </p:stCondLst>
+                                  <p:childTnLst>
+                                    <p:set>
+                                      <p:cBhvr>
+                                        <p:cTn id="84" dur="1" fill="hold">
+                                          <p:stCondLst>
+                                            <p:cond delay="0"/>
+                                          </p:stCondLst>
+                                        </p:cTn>
+                                        <p:tgtEl>
+                                          <p:spTgt spid="28"/>
+                                        </p:tgtEl>
+                                        <p:attrNameLst>
+                                          <p:attrName>style.visibility</p:attrName>
+                                        </p:attrNameLst>
+                                      </p:cBhvr>
+                                      <p:to>
+                                        <p:strVal val="visible"/>
+                                      </p:to>
+                                    </p:set>
+                                  </p:childTnLst>
+                                </p:cTn>
+                              </p:par>
+                              <p:par>
+                                <p:cTn id="85" presetID="1" presetClass="entr" presetSubtype="0" fill="hold" nodeType="withEffect">
+                                  <p:stCondLst>
+                                    <p:cond delay="0"/>
+                                  </p:stCondLst>
+                                  <p:childTnLst>
+                                    <p:set>
+                                      <p:cBhvr>
+                                        <p:cTn id="86" dur="1" fill="hold">
+                                          <p:stCondLst>
+                                            <p:cond delay="0"/>
+                                          </p:stCondLst>
+                                        </p:cTn>
+                                        <p:tgtEl>
+                                          <p:spTgt spid="32"/>
+                                        </p:tgtEl>
+                                        <p:attrNameLst>
+                                          <p:attrName>style.visibility</p:attrName>
+                                        </p:attrNameLst>
+                                      </p:cBhvr>
+                                      <p:to>
+                                        <p:strVal val="visible"/>
+                                      </p:to>
+                                    </p:set>
+                                  </p:childTnLst>
+                                </p:cTn>
+                              </p:par>
+                              <p:par>
+                                <p:cTn id="87" presetID="1" presetClass="entr" presetSubtype="0" fill="hold" grpId="0" nodeType="withEffect">
+                                  <p:stCondLst>
+                                    <p:cond delay="0"/>
+                                  </p:stCondLst>
+                                  <p:childTnLst>
+                                    <p:set>
+                                      <p:cBhvr>
+                                        <p:cTn id="88" dur="1" fill="hold">
+                                          <p:stCondLst>
+                                            <p:cond delay="0"/>
+                                          </p:stCondLst>
+                                        </p:cTn>
+                                        <p:tgtEl>
+                                          <p:spTgt spid="53"/>
+                                        </p:tgtEl>
+                                        <p:attrNameLst>
+                                          <p:attrName>style.visibility</p:attrName>
+                                        </p:attrNameLst>
+                                      </p:cBhvr>
+                                      <p:to>
+                                        <p:strVal val="visible"/>
+                                      </p:to>
+                                    </p:set>
+                                  </p:childTnLst>
+                                </p:cTn>
+                              </p:par>
+                            </p:childTnLst>
+                          </p:cTn>
+                        </p:par>
+                      </p:childTnLst>
+                    </p:cTn>
+                  </p:par>
+                </p:childTnLst>
+              </p:cTn>
+              <p:prevCondLst>
+                <p:cond evt="onPrev" delay="0">
+                  <p:tgtEl>
+                    <p:sldTgt/>
+                  </p:tgtEl>
+                </p:cond>
+              </p:prevCondLst>
+              <p:nextCondLst>
+                <p:cond evt="onNext" delay="0">
+                  <p:tgtEl>
+                    <p:sldTgt/>
+                  </p:tgtEl>
+                </p:cond>
+              </p:nextCondLst>
+            </p:seq>
+          </p:childTnLst>
+        </p:cTn>
+      </p:par>
+    </p:tnLst>
+    <p:bldLst>
+      <p:bldP spid="33" grpId="0" animBg="1"/>
+      <p:bldP spid="34" grpId="0" animBg="1"/>
+      <p:bldP spid="35" grpId="0" animBg="1"/>
+      <p:bldP spid="36" grpId="0"/>
+      <p:bldP spid="37" grpId="0"/>
+      <p:bldP spid="38" grpId="0"/>
+      <p:bldP spid="39" grpId="0"/>
+      <p:bldP spid="48" grpId="0"/>
+      <p:bldP spid="49" grpId="0"/>
+      <p:bldP spid="50" grpId="0"/>
+      <p:bldP spid="51" grpId="0"/>
+      <p:bldP spid="52" grpId="0"/>
+      <p:bldP spid="53" grpId="0"/>
+      <p:bldP spid="54" grpId="0"/>
+      <p:bldP spid="5" grpId="0"/>
+      <p:bldP spid="47" grpId="0"/>
+    </p:bldLst>
+  </p:timing>
 </p:sld>
 </file>
 

</xml_diff>